<commit_message>
added empty angular project
</commit_message>
<xml_diff>
--- a/CommitMessages/CodingDojo_CommitMessages.pptx
+++ b/CommitMessages/CodingDojo_CommitMessages.pptx
@@ -9516,12 +9516,8 @@
           <a:p>
             <a:pPr lvl="1"/>
             <a:r>
-              <a:rPr lang="en-GB"/>
-              <a:t>Console (C#), WPF (C#), </a:t>
-            </a:r>
-            <a:r>
               <a:rPr lang="en-GB" dirty="0"/>
-              <a:t>Angular </a:t>
+              <a:t>Console (C#), WPF (C#), Angular </a:t>
             </a:r>
             <a:r>
               <a:rPr lang="en-GB" dirty="0" err="1"/>
@@ -9565,28 +9561,12 @@
             </a:r>
             <a:r>
               <a:rPr lang="en-GB" dirty="0" err="1"/>
-              <a:t>eigene</a:t>
-            </a:r>
-            <a:r>
-              <a:rPr lang="en-GB" dirty="0"/>
-              <a:t> </a:t>
-            </a:r>
-            <a:r>
-              <a:rPr lang="en-GB" dirty="0" err="1"/>
-              <a:t>Applikation</a:t>
-            </a:r>
-            <a:r>
-              <a:rPr lang="en-GB" dirty="0"/>
-              <a:t> </a:t>
-            </a:r>
-            <a:r>
-              <a:rPr lang="en-GB" dirty="0" err="1"/>
-              <a:t>hinzufügen</a:t>
-            </a:r>
-            <a:endParaRPr lang="de-AT" dirty="0"/>
-          </a:p>
-          <a:p>
-            <a:pPr lvl="1"/>
+              <a:t>eigener</a:t>
+            </a:r>
+            <a:r>
+              <a:rPr lang="en-GB"/>
+              <a:t> Stack</a:t>
+            </a:r>
             <a:endParaRPr lang="en-GB" dirty="0"/>
           </a:p>
           <a:p>

</xml_diff>

<commit_message>
update ppt, added pic of msgs
</commit_message>
<xml_diff>
--- a/CommitMessages/CodingDojo_CommitMessages.pptx
+++ b/CommitMessages/CodingDojo_CommitMessages.pptx
@@ -9254,6 +9254,16 @@
             </a:r>
           </a:p>
           <a:p>
+            <a:pPr marL="742950" lvl="1" indent="-285750">
+              <a:buFont typeface="Arial" panose="020B0604020202020204" pitchFamily="34" charset="0"/>
+              <a:buChar char="•"/>
+            </a:pPr>
+            <a:r>
+              <a:rPr lang="de-AT" dirty="0"/>
+              <a:t>Cherrypickable/Revertable</a:t>
+            </a:r>
+          </a:p>
+          <a:p>
             <a:pPr marL="285750" indent="-285750">
               <a:buFont typeface="Arial" panose="020B0604020202020204" pitchFamily="34" charset="0"/>
               <a:buChar char="•"/>
@@ -9279,10 +9289,9 @@
               <a:buChar char="•"/>
             </a:pPr>
             <a:r>
-              <a:rPr lang="de-DE"/>
+              <a:rPr lang="de-DE" dirty="0"/>
               <a:t>Für späteres Finden, automatisches Verlinken der WorkItems</a:t>
             </a:r>
-            <a:endParaRPr lang="de-DE" dirty="0"/>
           </a:p>
           <a:p>
             <a:pPr marL="285750" indent="-285750">
@@ -9292,16 +9301,6 @@
             <a:r>
               <a:rPr lang="de-DE" dirty="0"/>
               <a:t>Nicht zu lang (richtige Granularität)</a:t>
-            </a:r>
-          </a:p>
-          <a:p>
-            <a:pPr marL="285750" indent="-285750">
-              <a:buFont typeface="Arial" panose="020B0604020202020204" pitchFamily="34" charset="0"/>
-              <a:buChar char="•"/>
-            </a:pPr>
-            <a:r>
-              <a:rPr lang="de-AT" dirty="0"/>
-              <a:t>Cherrypickable/Revertable</a:t>
             </a:r>
           </a:p>
           <a:p>
@@ -9916,6 +9915,31 @@
             <a:r>
               <a:rPr lang="de-DE" dirty="0"/>
               <a:t>Welche Hooks für Commits habt ihr für euch entdeckt?</a:t>
+            </a:r>
+          </a:p>
+          <a:p>
+            <a:r>
+              <a:rPr lang="de-DE" dirty="0"/>
+              <a:t>Wie seid ihr mit Greenfield umgegangen?</a:t>
+            </a:r>
+          </a:p>
+          <a:p>
+            <a:r>
+              <a:rPr lang="de-DE" dirty="0"/>
+              <a:t>Wie hat VS Sharing funktioniert?</a:t>
+            </a:r>
+          </a:p>
+          <a:p>
+            <a:pPr lvl="1"/>
+            <a:r>
+              <a:rPr lang="de-DE" dirty="0"/>
+              <a:t>Code selbst gut, Kontext Menü etc eher schlecht</a:t>
+            </a:r>
+          </a:p>
+          <a:p>
+            <a:r>
+              <a:rPr lang="de-DE" dirty="0"/>
+              <a:t>TDD unterstützt von den Msgs</a:t>
             </a:r>
           </a:p>
         </p:txBody>

</xml_diff>